<commit_message>
Update assignment 2, add lecture 7 & 8
</commit_message>
<xml_diff>
--- a/courses/sehci/lecture6.pptx
+++ b/courses/sehci/lecture6.pptx
@@ -269,7 +269,7 @@
             <a:fld id="{CB44B6B1-5441-9644-AE1C-BB7EA5DBA264}" type="datetimeFigureOut">
               <a:rPr lang="en-US" smtClean="0"/>
               <a:pPr/>
-              <a:t>10/11/17</a:t>
+              <a:t>10/14/17</a:t>
             </a:fld>
             <a:endParaRPr lang="en-US"/>
           </a:p>
@@ -437,7 +437,7 @@
             <a:fld id="{41878819-472C-A14B-95BF-39C94BA106B2}" type="datetimeFigureOut">
               <a:rPr lang="en-US" smtClean="0"/>
               <a:pPr/>
-              <a:t>10/11/17</a:t>
+              <a:t>10/14/17</a:t>
             </a:fld>
             <a:endParaRPr lang="en-US"/>
           </a:p>
@@ -4847,11 +4847,7 @@
           <a:p>
             <a:r>
               <a:rPr lang="en-US" dirty="0" smtClean="0"/>
-              <a:t>Lecture </a:t>
-            </a:r>
-            <a:r>
-              <a:rPr lang="en-US" dirty="0" smtClean="0"/>
-              <a:t>6: Usability testing</a:t>
+              <a:t>Lecture 6: Usability testing</a:t>
             </a:r>
             <a:endParaRPr lang="en-US" dirty="0"/>
           </a:p>
@@ -4939,7 +4935,6 @@
               <a:rPr lang="en-US" dirty="0"/>
               <a:t>Focus groups are not usability tests</a:t>
             </a:r>
-            <a:endParaRPr lang="en-US" dirty="0"/>
           </a:p>
         </p:txBody>
       </p:sp>
@@ -4999,7 +4994,6 @@
               <a:rPr lang="en-US" sz="2000" dirty="0"/>
               <a:t>Focus groups are good for quickly getting a sampling of users’ feelings and opinions about things.</a:t>
             </a:r>
-            <a:endParaRPr lang="en-US" sz="2000" dirty="0"/>
           </a:p>
           <a:p>
             <a:r>
@@ -5028,7 +5022,6 @@
               <a:rPr lang="en-US" sz="2000" dirty="0"/>
               <a:t>not good for learning about whether your site works and how to improve it</a:t>
             </a:r>
-            <a:endParaRPr lang="en-US" sz="2000" dirty="0"/>
           </a:p>
         </p:txBody>
       </p:sp>
@@ -5254,11 +5247,7 @@
           <a:p>
             <a:r>
               <a:rPr lang="en-US" dirty="0" smtClean="0"/>
-              <a:t>Lecture </a:t>
-            </a:r>
-            <a:r>
-              <a:rPr lang="en-US" dirty="0" smtClean="0"/>
-              <a:t>6: Usability testing</a:t>
+              <a:t>Lecture 6: Usability testing</a:t>
             </a:r>
             <a:endParaRPr lang="en-US" dirty="0"/>
           </a:p>
@@ -5346,7 +5335,6 @@
               <a:rPr lang="en-US" dirty="0"/>
               <a:t>Do-it-yourself usability testing</a:t>
             </a:r>
-            <a:endParaRPr lang="en-US" dirty="0"/>
           </a:p>
         </p:txBody>
       </p:sp>
@@ -5688,11 +5676,7 @@
           <a:p>
             <a:r>
               <a:rPr lang="en-US" dirty="0" smtClean="0"/>
-              <a:t>Lecture </a:t>
-            </a:r>
-            <a:r>
-              <a:rPr lang="en-US" dirty="0" smtClean="0"/>
-              <a:t>6: Usability testing</a:t>
+              <a:t>Lecture 6: Usability testing</a:t>
             </a:r>
             <a:endParaRPr lang="en-US" dirty="0"/>
           </a:p>
@@ -5780,7 +5764,6 @@
               <a:rPr lang="en-US" dirty="0"/>
               <a:t>Do-it-yourself usability testing</a:t>
             </a:r>
-            <a:endParaRPr lang="en-US" dirty="0"/>
           </a:p>
         </p:txBody>
       </p:sp>
@@ -6105,7 +6088,6 @@
               <a:rPr lang="en-US" dirty="0"/>
               <a:t>How many users do you need?</a:t>
             </a:r>
-            <a:endParaRPr lang="en-US" dirty="0"/>
           </a:p>
         </p:txBody>
       </p:sp>
@@ -6152,7 +6134,6 @@
               <a:rPr lang="en-US" dirty="0"/>
               <a:t>You don’t need to find all of the problems: You can find more problems in half a day than you can fix in a month.</a:t>
             </a:r>
-            <a:endParaRPr lang="en-US" dirty="0"/>
           </a:p>
         </p:txBody>
       </p:sp>
@@ -6278,7 +6259,6 @@
               <a:rPr lang="en-US" dirty="0"/>
               <a:t>How do you choose the participants?</a:t>
             </a:r>
-            <a:endParaRPr lang="en-US" dirty="0"/>
           </a:p>
         </p:txBody>
       </p:sp>
@@ -6816,11 +6796,7 @@
           <a:p>
             <a:r>
               <a:rPr lang="en-US" dirty="0" smtClean="0"/>
-              <a:t>Today’s topics: Usability </a:t>
-            </a:r>
-            <a:r>
-              <a:rPr lang="en-US" dirty="0" smtClean="0"/>
-              <a:t>testing</a:t>
+              <a:t>Today’s topics: Usability testing</a:t>
             </a:r>
             <a:endParaRPr lang="en-US" dirty="0"/>
           </a:p>
@@ -6869,11 +6845,6 @@
               </a:rPr>
               <a:t>Assignment 2</a:t>
             </a:r>
-            <a:endParaRPr lang="en-US" b="1" dirty="0" smtClean="0">
-              <a:solidFill>
-                <a:schemeClr val="folHlink"/>
-              </a:solidFill>
-            </a:endParaRPr>
           </a:p>
           <a:p>
             <a:endParaRPr lang="en-US" dirty="0" smtClean="0"/>
@@ -8655,8 +8626,17 @@
             <a:pPr lvl="1"/>
             <a:r>
               <a:rPr lang="en-US" dirty="0" smtClean="0"/>
-              <a:t>Ordered problem lists.</a:t>
-            </a:r>
+              <a:t>Ordered </a:t>
+            </a:r>
+            <a:r>
+              <a:rPr lang="en-US" smtClean="0"/>
+              <a:t>problem </a:t>
+            </a:r>
+            <a:r>
+              <a:rPr lang="en-US" smtClean="0"/>
+              <a:t>lists.</a:t>
+            </a:r>
+            <a:endParaRPr lang="en-US" dirty="0" smtClean="0"/>
           </a:p>
           <a:p>
             <a:r>
@@ -8772,6 +8752,13 @@
   <p:transition spd="med">
     <p:wipe dir="r"/>
   </p:transition>
+  <p:timing>
+    <p:tnLst>
+      <p:par>
+        <p:cTn id="1" dur="indefinite" restart="never" nodeType="tmRoot"/>
+      </p:par>
+    </p:tnLst>
+  </p:timing>
 </p:sld>
 </file>
 
@@ -8814,11 +8801,7 @@
           <a:p>
             <a:r>
               <a:rPr lang="en-US" dirty="0" smtClean="0"/>
-              <a:t>Lecture </a:t>
-            </a:r>
-            <a:r>
-              <a:rPr lang="en-US" dirty="0" smtClean="0"/>
-              <a:t>6: Usability testing</a:t>
+              <a:t>Lecture 6: Usability testing</a:t>
             </a:r>
             <a:endParaRPr lang="en-US" dirty="0"/>
           </a:p>
@@ -8961,11 +8944,7 @@
           <a:p>
             <a:r>
               <a:rPr lang="en-US" dirty="0" smtClean="0"/>
-              <a:t>Lecture </a:t>
-            </a:r>
-            <a:r>
-              <a:rPr lang="en-US" dirty="0" smtClean="0"/>
-              <a:t>6: Usability testing</a:t>
+              <a:t>Lecture 6: Usability testing</a:t>
             </a:r>
             <a:endParaRPr lang="en-US" dirty="0"/>
           </a:p>
@@ -9115,11 +9094,7 @@
           <a:p>
             <a:r>
               <a:rPr lang="en-US" dirty="0" smtClean="0"/>
-              <a:t>Lecture </a:t>
-            </a:r>
-            <a:r>
-              <a:rPr lang="en-US" dirty="0" smtClean="0"/>
-              <a:t>6: Usability testing</a:t>
+              <a:t>Lecture 6: Usability testing</a:t>
             </a:r>
             <a:endParaRPr lang="en-US" dirty="0"/>
           </a:p>
@@ -9355,11 +9330,7 @@
           <a:p>
             <a:r>
               <a:rPr lang="en-US" dirty="0" smtClean="0"/>
-              <a:t>Lecture </a:t>
-            </a:r>
-            <a:r>
-              <a:rPr lang="en-US" dirty="0" smtClean="0"/>
-              <a:t>6: Usability testing</a:t>
+              <a:t>Lecture 6: Usability testing</a:t>
             </a:r>
             <a:endParaRPr lang="en-US" dirty="0"/>
           </a:p>
@@ -9637,11 +9608,7 @@
           <a:p>
             <a:r>
               <a:rPr lang="en-US" dirty="0" smtClean="0"/>
-              <a:t>Lecture </a:t>
-            </a:r>
-            <a:r>
-              <a:rPr lang="en-US" dirty="0" smtClean="0"/>
-              <a:t>6: Usability testing</a:t>
+              <a:t>Lecture 6: Usability testing</a:t>
             </a:r>
             <a:endParaRPr lang="en-US" dirty="0"/>
           </a:p>
@@ -9729,7 +9696,6 @@
               <a:rPr lang="en-US" dirty="0"/>
               <a:t>The myth of the Average User</a:t>
             </a:r>
-            <a:endParaRPr lang="en-US" dirty="0"/>
           </a:p>
         </p:txBody>
       </p:sp>

</xml_diff>